<commit_message>
Se agrega imagen de la base de datos de mongo db a la presentacion
</commit_message>
<xml_diff>
--- a/DOCUMENTOS_PROYECTO_MYSTICALCUT/Trimestre_3/Presentacion/Presentación del Proyecto Mystical cut final.pptx
+++ b/DOCUMENTOS_PROYECTO_MYSTICALCUT/Trimestre_3/Presentacion/Presentación del Proyecto Mystical cut final.pptx
@@ -133,7 +133,7 @@
           <a:p>
             <a:fld id="{F3A95CE1-84B0-4F6B-9753-6804FA03EAE1}" type="datetimeFigureOut">
               <a:rPr lang="es-CO" smtClean="0"/>
-              <a:t>4/12/2024</a:t>
+              <a:t>6/12/2024</a:t>
             </a:fld>
             <a:endParaRPr lang="es-CO"/>
           </a:p>
@@ -636,7 +636,7 @@
           <a:p>
             <a:fld id="{09ACC33D-2F5D-410B-8451-686160647FEB}" type="datetime1">
               <a:rPr lang="en-US" smtClean="0"/>
-              <a:t>12/4/2024</a:t>
+              <a:t>12/6/2024</a:t>
             </a:fld>
             <a:endParaRPr lang="en-US"/>
           </a:p>
@@ -813,7 +813,7 @@
           <a:p>
             <a:fld id="{161FD5B6-F778-46C6-B9D5-439CFB49676D}" type="datetime1">
               <a:rPr lang="en-US" smtClean="0"/>
-              <a:t>12/4/2024</a:t>
+              <a:t>12/6/2024</a:t>
             </a:fld>
             <a:endParaRPr lang="en-US"/>
           </a:p>
@@ -1057,7 +1057,7 @@
           <a:p>
             <a:fld id="{44D58D29-4766-4272-B394-7B2D94CA84EC}" type="datetime1">
               <a:rPr lang="en-US" smtClean="0"/>
-              <a:t>12/4/2024</a:t>
+              <a:t>12/6/2024</a:t>
             </a:fld>
             <a:endParaRPr lang="en-US"/>
           </a:p>
@@ -1235,7 +1235,7 @@
           <a:p>
             <a:fld id="{4379EB59-2D53-4D52-A615-1216927C25FE}" type="datetime1">
               <a:rPr lang="en-US" smtClean="0"/>
-              <a:t>12/4/2024</a:t>
+              <a:t>12/6/2024</a:t>
             </a:fld>
             <a:endParaRPr lang="en-US"/>
           </a:p>
@@ -1354,7 +1354,7 @@
           <a:p>
             <a:fld id="{DB0DE0B6-7121-4FF5-A7EB-386AE14FBCEE}" type="datetime1">
               <a:rPr lang="en-US" smtClean="0"/>
-              <a:t>12/4/2024</a:t>
+              <a:t>12/6/2024</a:t>
             </a:fld>
             <a:endParaRPr lang="en-US"/>
           </a:p>
@@ -1579,7 +1579,7 @@
           <a:p>
             <a:fld id="{D099D791-5A16-4B64-92F1-CC236E3EC932}" type="datetime1">
               <a:rPr lang="en-US" smtClean="0"/>
-              <a:t>12/4/2024</a:t>
+              <a:t>12/6/2024</a:t>
             </a:fld>
             <a:endParaRPr lang="en-US"/>
           </a:p>
@@ -5712,6 +5712,36 @@
           </a:p>
         </p:txBody>
       </p:sp>
+      <p:pic>
+        <p:nvPicPr>
+          <p:cNvPr id="2" name="Imagen 1">
+            <a:extLst>
+              <a:ext uri="{FF2B5EF4-FFF2-40B4-BE49-F238E27FC236}">
+                <a16:creationId xmlns:a16="http://schemas.microsoft.com/office/drawing/2014/main" id="{F297D10B-0E19-4080-A7F4-CB5AD73E81B0}"/>
+              </a:ext>
+            </a:extLst>
+          </p:cNvPr>
+          <p:cNvPicPr>
+            <a:picLocks noChangeAspect="1"/>
+          </p:cNvPicPr>
+          <p:nvPr/>
+        </p:nvPicPr>
+        <p:blipFill>
+          <a:blip r:embed="rId6"/>
+          <a:stretch>
+            <a:fillRect/>
+          </a:stretch>
+        </p:blipFill>
+        <p:spPr>
+          <a:xfrm>
+            <a:off x="1676400" y="1744612"/>
+            <a:ext cx="8686800" cy="3368776"/>
+          </a:xfrm>
+          <a:prstGeom prst="rect">
+            <a:avLst/>
+          </a:prstGeom>
+        </p:spPr>
+      </p:pic>
     </p:spTree>
     <p:extLst>
       <p:ext uri="{BB962C8B-B14F-4D97-AF65-F5344CB8AC3E}">

</xml_diff>